<commit_message>
Updated slides for week 1
</commit_message>
<xml_diff>
--- a/Lectures/week 1/week 1 - Course Information 2024.pptx
+++ b/Lectures/week 1/week 1 - Course Information 2024.pptx
@@ -4879,14 +4879,12 @@
               <a:t> </a:t>
             </a:r>
             <a:r>
-              <a:rPr lang="fr-CH" sz="2400" dirty="0">
+              <a:rPr lang="en-GB" sz="1600" b="0" i="0" dirty="0">
+                <a:effectLst/>
+                <a:latin typeface="Helvetica" pitchFamily="2" charset="0"/>
                 <a:hlinkClick r:id="rId3"/>
               </a:rPr>
-              <a:t>https://epfl.zoom.us/j/66237387610</a:t>
-            </a:r>
-            <a:r>
-              <a:rPr lang="fr-CH" sz="2400" dirty="0"/>
-              <a:t> </a:t>
+              <a:t>https://epfl.zoom.us/j/63657026419</a:t>
             </a:r>
             <a:br>
               <a:rPr lang="fr-CH" sz="2400" dirty="0"/>
@@ -4904,7 +4902,7 @@
             </a:r>
             <a:r>
               <a:rPr lang="fr-CH" sz="2400" dirty="0"/>
-              <a:t>12:15-14:00, CM1105</a:t>
+              <a:t>12:15-14:00, CM2</a:t>
             </a:r>
             <a:br>
               <a:rPr lang="fr-CH" sz="2400" dirty="0"/>
@@ -5309,7 +5307,7 @@
               <a:rPr lang="en-GB" dirty="0">
                 <a:hlinkClick r:id="rId2"/>
               </a:rPr>
-              <a:t>https://edstem.org/eu/courses/831/discussion/</a:t>
+              <a:t>https://edstem.org/eu/courses/1652</a:t>
             </a:r>
             <a:endParaRPr lang="en-GB" dirty="0"/>
           </a:p>
@@ -6536,7 +6534,7 @@
                     <a:p>
                       <a:pPr algn="l" fontAlgn="b"/>
                       <a:r>
-                        <a:rPr lang="en-GB" sz="1200" u="none" strike="noStrike" cap="none" spc="0">
+                        <a:rPr lang="en-GB" sz="1200" u="none" strike="noStrike" cap="none" spc="0" dirty="0">
                           <a:solidFill>
                             <a:schemeClr val="tx1"/>
                           </a:solidFill>
@@ -6546,7 +6544,7 @@
                         </a:rPr>
                         <a:t>Information Retrieval</a:t>
                       </a:r>
-                      <a:endParaRPr lang="en-GB" sz="1200" b="0" i="0" u="none" strike="noStrike" cap="none" spc="0">
+                      <a:endParaRPr lang="en-GB" sz="1200" b="0" i="0" u="none" strike="noStrike" cap="none" spc="0" dirty="0">
                         <a:solidFill>
                           <a:schemeClr val="tx1"/>
                         </a:solidFill>
@@ -6792,7 +6790,7 @@
                     <a:p>
                       <a:pPr algn="l" fontAlgn="b"/>
                       <a:r>
-                        <a:rPr lang="en-CH" sz="1200" u="none" strike="noStrike" cap="none" spc="0">
+                        <a:rPr lang="en-CH" sz="1200" u="none" strike="noStrike" cap="none" spc="0" dirty="0">
                           <a:solidFill>
                             <a:schemeClr val="tx1"/>
                           </a:solidFill>
@@ -6802,7 +6800,7 @@
                         </a:rPr>
                         <a:t> </a:t>
                       </a:r>
-                      <a:endParaRPr lang="en-CH" sz="1200" b="0" i="0" u="none" strike="noStrike" cap="none" spc="0">
+                      <a:endParaRPr lang="en-CH" sz="1200" b="0" i="0" u="none" strike="noStrike" cap="none" spc="0" dirty="0">
                         <a:solidFill>
                           <a:schemeClr val="tx1"/>
                         </a:solidFill>
@@ -16660,10 +16658,9 @@
                 <a:latin typeface="Helvetica" pitchFamily="2" charset="0"/>
                 <a:hlinkClick r:id="rId3"/>
               </a:rPr>
-              <a:t>https://epfl.zoom.us/j/66462767931</a:t>
-            </a:r>
-            <a:endParaRPr lang="en-GB" b="0" i="0" dirty="0">
-              <a:effectLst/>
+              <a:t>https://epfl.zoom.us/j/63657026419</a:t>
+            </a:r>
+            <a:endParaRPr lang="en-GB" dirty="0">
               <a:latin typeface="Helvetica" pitchFamily="2" charset="0"/>
             </a:endParaRPr>
           </a:p>

</xml_diff>